<commit_message>
# added final decks
</commit_message>
<xml_diff>
--- a/webcast.pptx
+++ b/webcast.pptx
@@ -5,10 +5,10 @@
     <p:sldMasterId id="2147483648" r:id="rId8"/>
   </p:sldMasterIdLst>
   <p:notesMasterIdLst>
-    <p:notesMasterId r:id="rId33"/>
+    <p:notesMasterId r:id="rId34"/>
   </p:notesMasterIdLst>
   <p:handoutMasterIdLst>
-    <p:handoutMasterId r:id="rId34"/>
+    <p:handoutMasterId r:id="rId35"/>
   </p:handoutMasterIdLst>
   <p:sldIdLst>
     <p:sldId id="256" r:id="rId9"/>
@@ -29,12 +29,13 @@
     <p:sldId id="295" r:id="rId24"/>
     <p:sldId id="296" r:id="rId25"/>
     <p:sldId id="303" r:id="rId26"/>
-    <p:sldId id="299" r:id="rId27"/>
-    <p:sldId id="300" r:id="rId28"/>
-    <p:sldId id="301" r:id="rId29"/>
-    <p:sldId id="302" r:id="rId30"/>
-    <p:sldId id="297" r:id="rId31"/>
-    <p:sldId id="292" r:id="rId32"/>
+    <p:sldId id="304" r:id="rId27"/>
+    <p:sldId id="299" r:id="rId28"/>
+    <p:sldId id="300" r:id="rId29"/>
+    <p:sldId id="301" r:id="rId30"/>
+    <p:sldId id="302" r:id="rId31"/>
+    <p:sldId id="297" r:id="rId32"/>
+    <p:sldId id="292" r:id="rId33"/>
   </p:sldIdLst>
   <p:sldSz cx="12192000" cy="6858000"/>
   <p:notesSz cx="6858000" cy="9144000"/>
@@ -935,7 +936,7 @@
                 </a:solidFill>
               </a:rPr>
               <a:pPr/>
-              <a:t>19</a:t>
+              <a:t>20</a:t>
             </a:fld>
             <a:endParaRPr lang="en-US" dirty="0">
               <a:solidFill>
@@ -1028,7 +1029,7 @@
                 </a:solidFill>
               </a:rPr>
               <a:pPr/>
-              <a:t>20</a:t>
+              <a:t>21</a:t>
             </a:fld>
             <a:endParaRPr lang="en-US" dirty="0">
               <a:solidFill>
@@ -1117,7 +1118,7 @@
             <a:fld id="{8B263312-38AA-4E1E-B2B5-0F8F122B24FE}" type="slidenum">
               <a:rPr lang="en-US" smtClean="0"/>
               <a:pPr/>
-              <a:t>21</a:t>
+              <a:t>22</a:t>
             </a:fld>
             <a:endParaRPr lang="en-US" dirty="0"/>
           </a:p>
@@ -1202,7 +1203,7 @@
             <a:fld id="{8B263312-38AA-4E1E-B2B5-0F8F122B24FE}" type="slidenum">
               <a:rPr lang="en-US" smtClean="0"/>
               <a:pPr/>
-              <a:t>22</a:t>
+              <a:t>23</a:t>
             </a:fld>
             <a:endParaRPr lang="en-US" dirty="0"/>
           </a:p>
@@ -5902,7 +5903,7 @@
           <a:graphicData uri="http://schemas.openxmlformats.org/presentationml/2006/ole">
             <mc:AlternateContent xmlns:mc="http://schemas.openxmlformats.org/markup-compatibility/2006">
               <mc:Choice xmlns:v="urn:schemas-microsoft-com:vml" Requires="v">
-                <p:oleObj spid="_x0000_s2178" name="think-cell Slide" r:id="rId9" imgW="360" imgH="360" progId="">
+                <p:oleObj spid="_x0000_s2189" name="think-cell Slide" r:id="rId9" imgW="360" imgH="360" progId="">
                   <p:embed/>
                 </p:oleObj>
               </mc:Choice>
@@ -8389,16 +8390,7 @@
                 </a:solidFill>
                 <a:latin typeface="+mj-lt"/>
               </a:rPr>
-              <a:t>Empaqueta Smooth</a:t>
-            </a:r>
-            <a:r>
-              <a:rPr lang="es-AR" sz="1500" b="1" dirty="0">
-                <a:solidFill>
-                  <a:schemeClr val="bg1"/>
-                </a:solidFill>
-                <a:latin typeface="+mj-lt"/>
-              </a:rPr>
-              <a:t> Streaming</a:t>
+              <a:t>Empaqueta Smooth Streaming</a:t>
             </a:r>
             <a:r>
               <a:rPr lang="es-AR" sz="1500" b="1" dirty="0">
@@ -8425,25 +8417,7 @@
                 </a:solidFill>
                 <a:latin typeface="+mj-lt"/>
               </a:rPr>
-              <a:t>(road </a:t>
-            </a:r>
-            <a:r>
-              <a:rPr lang="es-AR" sz="1500" b="1" dirty="0" err="1" smtClean="0">
-                <a:solidFill>
-                  <a:schemeClr val="bg1"/>
-                </a:solidFill>
-                <a:latin typeface="+mj-lt"/>
-              </a:rPr>
-              <a:t>map</a:t>
-            </a:r>
-            <a:r>
-              <a:rPr lang="es-AR" sz="1500" b="1" dirty="0" smtClean="0">
-                <a:solidFill>
-                  <a:schemeClr val="bg1"/>
-                </a:solidFill>
-                <a:latin typeface="+mj-lt"/>
-              </a:rPr>
-              <a:t>)</a:t>
+              <a:t>(road map)</a:t>
             </a:r>
             <a:endParaRPr lang="es-AR" sz="1500" b="1" dirty="0">
               <a:solidFill>
@@ -10722,7 +10696,7 @@
           <a:graphicData uri="http://schemas.openxmlformats.org/presentationml/2006/ole">
             <mc:AlternateContent xmlns:mc="http://schemas.openxmlformats.org/markup-compatibility/2006">
               <mc:Choice xmlns:v="urn:schemas-microsoft-com:vml" Requires="v">
-                <p:oleObj spid="_x0000_s3201" name="think-cell Slide" r:id="rId8" imgW="360" imgH="360" progId="">
+                <p:oleObj spid="_x0000_s3212" name="think-cell Slide" r:id="rId8" imgW="360" imgH="360" progId="">
                   <p:embed/>
                 </p:oleObj>
               </mc:Choice>
@@ -13540,16 +13514,7 @@
                 </a:solidFill>
                 <a:latin typeface="+mj-lt"/>
               </a:rPr>
-              <a:t>Smooth</a:t>
-            </a:r>
-            <a:r>
-              <a:rPr lang="es-AR" sz="1500" b="1" dirty="0">
-                <a:solidFill>
-                  <a:schemeClr val="bg1"/>
-                </a:solidFill>
-                <a:latin typeface="+mj-lt"/>
-              </a:rPr>
-              <a:t> Streaming o Apple HLS</a:t>
+              <a:t>Smooth Streaming o Apple HLS</a:t>
             </a:r>
           </a:p>
           <a:p>
@@ -14583,7 +14548,7 @@
           <a:graphicData uri="http://schemas.openxmlformats.org/presentationml/2006/ole">
             <mc:AlternateContent xmlns:mc="http://schemas.openxmlformats.org/markup-compatibility/2006">
               <mc:Choice xmlns:v="urn:schemas-microsoft-com:vml" Requires="v">
-                <p:oleObj spid="_x0000_s4224" name="think-cell Slide" r:id="rId11" imgW="360" imgH="360" progId="">
+                <p:oleObj spid="_x0000_s4235" name="think-cell Slide" r:id="rId11" imgW="360" imgH="360" progId="">
                   <p:embed/>
                 </p:oleObj>
               </mc:Choice>
@@ -17766,16 +17731,7 @@
                 </a:solidFill>
                 <a:latin typeface="+mj-lt"/>
               </a:rPr>
-              <a:t>) para MP4 y Smooth</a:t>
-            </a:r>
-            <a:r>
-              <a:rPr lang="es-AR" sz="1500" b="1" dirty="0">
-                <a:solidFill>
-                  <a:schemeClr val="bg1"/>
-                </a:solidFill>
-                <a:latin typeface="+mj-lt"/>
-              </a:rPr>
-              <a:t> Streaming </a:t>
+              <a:t>) para MP4 y Smooth Streaming </a:t>
             </a:r>
           </a:p>
           <a:p>
@@ -22386,19 +22342,7 @@
               <a:rPr lang="es-AR" dirty="0" smtClean="0">
                 <a:latin typeface="+mj-lt"/>
               </a:rPr>
-              <a:t>Formato de Entrada: Mp4 o </a:t>
-            </a:r>
-            <a:r>
-              <a:rPr lang="es-AR" dirty="0" err="1" smtClean="0">
-                <a:latin typeface="+mj-lt"/>
-              </a:rPr>
-              <a:t>Smooth</a:t>
-            </a:r>
-            <a:r>
-              <a:rPr lang="es-AR" dirty="0" smtClean="0">
-                <a:latin typeface="+mj-lt"/>
-              </a:rPr>
-              <a:t> Streaming </a:t>
+              <a:t>Formato de Entrada: Mp4 o Smooth Streaming </a:t>
             </a:r>
           </a:p>
           <a:p>
@@ -22406,19 +22350,7 @@
               <a:rPr lang="es-AR" dirty="0" smtClean="0">
                 <a:latin typeface="+mj-lt"/>
               </a:rPr>
-              <a:t>Formato de Salida: </a:t>
-            </a:r>
-            <a:r>
-              <a:rPr lang="es-AR" dirty="0" err="1" smtClean="0">
-                <a:latin typeface="+mj-lt"/>
-              </a:rPr>
-              <a:t>Smooth</a:t>
-            </a:r>
-            <a:r>
-              <a:rPr lang="es-AR" dirty="0" smtClean="0">
-                <a:latin typeface="+mj-lt"/>
-              </a:rPr>
-              <a:t> Streaming, Http-Live-Streaming v4 y MPEG-</a:t>
+              <a:t>Formato de Salida: Smooth Streaming, Http-Live-Streaming v4 y MPEG-</a:t>
             </a:r>
             <a:r>
               <a:rPr lang="es-AR" dirty="0" err="1" smtClean="0">
@@ -26000,10 +25932,942 @@
           </a:p>
         </p:txBody>
       </p:sp>
+      <p:pic>
+        <p:nvPicPr>
+          <p:cNvPr id="3" name="Picture 2"/>
+          <p:cNvPicPr>
+            <a:picLocks noChangeAspect="1"/>
+          </p:cNvPicPr>
+          <p:nvPr/>
+        </p:nvPicPr>
+        <p:blipFill rotWithShape="1">
+          <a:blip r:embed="rId2" cstate="print">
+            <a:extLst>
+              <a:ext uri="{28A0092B-C50C-407E-A947-70E740481C1C}">
+                <a14:useLocalDpi xmlns:a14="http://schemas.microsoft.com/office/drawing/2010/main" val="0"/>
+              </a:ext>
+            </a:extLst>
+          </a:blip>
+          <a:srcRect t="21576" b="31055"/>
+          <a:stretch/>
+        </p:blipFill>
+        <p:spPr>
+          <a:xfrm>
+            <a:off x="1747971" y="1941182"/>
+            <a:ext cx="2432270" cy="648072"/>
+          </a:xfrm>
+          <a:prstGeom prst="rect">
+            <a:avLst/>
+          </a:prstGeom>
+        </p:spPr>
+      </p:pic>
+      <p:pic>
+        <p:nvPicPr>
+          <p:cNvPr id="4" name="Picture 3"/>
+          <p:cNvPicPr>
+            <a:picLocks noChangeAspect="1"/>
+          </p:cNvPicPr>
+          <p:nvPr/>
+        </p:nvPicPr>
+        <p:blipFill>
+          <a:blip r:embed="rId3" cstate="print">
+            <a:extLst>
+              <a:ext uri="{28A0092B-C50C-407E-A947-70E740481C1C}">
+                <a14:useLocalDpi xmlns:a14="http://schemas.microsoft.com/office/drawing/2010/main" val="0"/>
+              </a:ext>
+            </a:extLst>
+          </a:blip>
+          <a:stretch>
+            <a:fillRect/>
+          </a:stretch>
+        </p:blipFill>
+        <p:spPr>
+          <a:xfrm>
+            <a:off x="5928212" y="1914848"/>
+            <a:ext cx="587560" cy="683920"/>
+          </a:xfrm>
+          <a:prstGeom prst="rect">
+            <a:avLst/>
+          </a:prstGeom>
+        </p:spPr>
+      </p:pic>
+      <p:pic>
+        <p:nvPicPr>
+          <p:cNvPr id="5" name="Picture 4"/>
+          <p:cNvPicPr>
+            <a:picLocks noChangeAspect="1"/>
+          </p:cNvPicPr>
+          <p:nvPr/>
+        </p:nvPicPr>
+        <p:blipFill rotWithShape="1">
+          <a:blip r:embed="rId4">
+            <a:extLst>
+              <a:ext uri="{28A0092B-C50C-407E-A947-70E740481C1C}">
+                <a14:useLocalDpi xmlns:a14="http://schemas.microsoft.com/office/drawing/2010/main" val="0"/>
+              </a:ext>
+            </a:extLst>
+          </a:blip>
+          <a:srcRect t="29452" b="30915"/>
+          <a:stretch/>
+        </p:blipFill>
+        <p:spPr>
+          <a:xfrm>
+            <a:off x="8263743" y="1941182"/>
+            <a:ext cx="2180285" cy="648072"/>
+          </a:xfrm>
+          <a:prstGeom prst="rect">
+            <a:avLst/>
+          </a:prstGeom>
+        </p:spPr>
+      </p:pic>
+      <p:sp>
+        <p:nvSpPr>
+          <p:cNvPr id="20" name="Rectangle 19"/>
+          <p:cNvSpPr/>
+          <p:nvPr/>
+        </p:nvSpPr>
+        <p:spPr>
+          <a:xfrm>
+            <a:off x="1987936" y="2598768"/>
+            <a:ext cx="1864934" cy="338554"/>
+          </a:xfrm>
+          <a:prstGeom prst="rect">
+            <a:avLst/>
+          </a:prstGeom>
+        </p:spPr>
+        <p:txBody>
+          <a:bodyPr wrap="none">
+            <a:spAutoFit/>
+          </a:bodyPr>
+          <a:lstStyle/>
+          <a:p>
+            <a:r>
+              <a:rPr lang="es-AR" sz="1600" dirty="0" smtClean="0"/>
+              <a:t>Smooth Streaming</a:t>
+            </a:r>
+          </a:p>
+        </p:txBody>
+      </p:sp>
+      <p:sp>
+        <p:nvSpPr>
+          <p:cNvPr id="21" name="Rectangle 20"/>
+          <p:cNvSpPr/>
+          <p:nvPr/>
+        </p:nvSpPr>
+        <p:spPr>
+          <a:xfrm>
+            <a:off x="5239639" y="2580256"/>
+            <a:ext cx="1964705" cy="338554"/>
+          </a:xfrm>
+          <a:prstGeom prst="rect">
+            <a:avLst/>
+          </a:prstGeom>
+        </p:spPr>
+        <p:txBody>
+          <a:bodyPr wrap="none">
+            <a:spAutoFit/>
+          </a:bodyPr>
+          <a:lstStyle/>
+          <a:p>
+            <a:r>
+              <a:rPr lang="es-AR" sz="1600" dirty="0" smtClean="0"/>
+              <a:t>Http Live Streaming</a:t>
+            </a:r>
+          </a:p>
+        </p:txBody>
+      </p:sp>
+      <p:sp>
+        <p:nvSpPr>
+          <p:cNvPr id="22" name="Rectangle 21"/>
+          <p:cNvSpPr/>
+          <p:nvPr/>
+        </p:nvSpPr>
+        <p:spPr>
+          <a:xfrm>
+            <a:off x="8154518" y="2598768"/>
+            <a:ext cx="2398734" cy="338554"/>
+          </a:xfrm>
+          <a:prstGeom prst="rect">
+            <a:avLst/>
+          </a:prstGeom>
+        </p:spPr>
+        <p:txBody>
+          <a:bodyPr wrap="none">
+            <a:spAutoFit/>
+          </a:bodyPr>
+          <a:lstStyle/>
+          <a:p>
+            <a:r>
+              <a:rPr lang="es-AR" sz="1600" dirty="0" smtClean="0"/>
+              <a:t>Http Dynamic Streaming</a:t>
+            </a:r>
+          </a:p>
+        </p:txBody>
+      </p:sp>
+      <p:sp>
+        <p:nvSpPr>
+          <p:cNvPr id="23" name="Rectangle 22"/>
+          <p:cNvSpPr/>
+          <p:nvPr/>
+        </p:nvSpPr>
+        <p:spPr>
+          <a:xfrm>
+            <a:off x="732142" y="3380794"/>
+            <a:ext cx="10808665" cy="461665"/>
+          </a:xfrm>
+          <a:prstGeom prst="rect">
+            <a:avLst/>
+          </a:prstGeom>
+        </p:spPr>
+        <p:txBody>
+          <a:bodyPr wrap="none">
+            <a:spAutoFit/>
+          </a:bodyPr>
+          <a:lstStyle/>
+          <a:p>
+            <a:r>
+              <a:rPr lang="es-AR" sz="2400" i="1" dirty="0" smtClean="0"/>
+              <a:t>Dynamic Adaptive Streaming over HTTP (DASH) también llamado MPEG-DASH </a:t>
+            </a:r>
+          </a:p>
+        </p:txBody>
+      </p:sp>
+      <p:sp>
+        <p:nvSpPr>
+          <p:cNvPr id="24" name="Rectangle 23"/>
+          <p:cNvSpPr/>
+          <p:nvPr/>
+        </p:nvSpPr>
+        <p:spPr>
+          <a:xfrm>
+            <a:off x="714574" y="4280055"/>
+            <a:ext cx="10905358" cy="830997"/>
+          </a:xfrm>
+          <a:prstGeom prst="rect">
+            <a:avLst/>
+          </a:prstGeom>
+        </p:spPr>
+        <p:txBody>
+          <a:bodyPr wrap="none">
+            <a:spAutoFit/>
+          </a:bodyPr>
+          <a:lstStyle/>
+          <a:p>
+            <a:r>
+              <a:rPr lang="es-AR" sz="2400" dirty="0" smtClean="0"/>
+              <a:t>MPEG-DASH es el primera solución de adaptive bit-</a:t>
+            </a:r>
+            <a:r>
+              <a:rPr lang="es-AR" sz="2400" dirty="0" err="1" smtClean="0"/>
+              <a:t>rate</a:t>
+            </a:r>
+            <a:r>
+              <a:rPr lang="es-AR" sz="2400" dirty="0" smtClean="0"/>
+              <a:t> streaming sobre HTTP </a:t>
+            </a:r>
+          </a:p>
+          <a:p>
+            <a:r>
+              <a:rPr lang="es-AR" sz="2400" dirty="0" smtClean="0"/>
+              <a:t>que </a:t>
+            </a:r>
+            <a:r>
+              <a:rPr lang="es-AR" sz="2400" dirty="0" smtClean="0">
+                <a:solidFill>
+                  <a:srgbClr val="00B0F0"/>
+                </a:solidFill>
+              </a:rPr>
+              <a:t>es un standard internacional (ISO/IEC 23009-1) </a:t>
+            </a:r>
+          </a:p>
+        </p:txBody>
+      </p:sp>
+      <p:pic>
+        <p:nvPicPr>
+          <p:cNvPr id="6" name="Picture 5"/>
+          <p:cNvPicPr>
+            <a:picLocks noChangeAspect="1"/>
+          </p:cNvPicPr>
+          <p:nvPr/>
+        </p:nvPicPr>
+        <p:blipFill>
+          <a:blip r:embed="rId5">
+            <a:extLst>
+              <a:ext uri="{28A0092B-C50C-407E-A947-70E740481C1C}">
+                <a14:useLocalDpi xmlns:a14="http://schemas.microsoft.com/office/drawing/2010/main" val="0"/>
+              </a:ext>
+            </a:extLst>
+          </a:blip>
+          <a:stretch>
+            <a:fillRect/>
+          </a:stretch>
+        </p:blipFill>
+        <p:spPr>
+          <a:xfrm>
+            <a:off x="5186363" y="5304302"/>
+            <a:ext cx="1819275" cy="581025"/>
+          </a:xfrm>
+          <a:prstGeom prst="rect">
+            <a:avLst/>
+          </a:prstGeom>
+        </p:spPr>
+      </p:pic>
+      <p:sp>
+        <p:nvSpPr>
+          <p:cNvPr id="7" name="Rectangle 6"/>
+          <p:cNvSpPr/>
+          <p:nvPr/>
+        </p:nvSpPr>
+        <p:spPr>
+          <a:xfrm>
+            <a:off x="5105339" y="5885327"/>
+            <a:ext cx="2233304" cy="369332"/>
+          </a:xfrm>
+          <a:prstGeom prst="rect">
+            <a:avLst/>
+          </a:prstGeom>
+        </p:spPr>
+        <p:txBody>
+          <a:bodyPr wrap="none">
+            <a:spAutoFit/>
+          </a:bodyPr>
+          <a:lstStyle/>
+          <a:p>
+            <a:r>
+              <a:rPr lang="en-US" dirty="0">
+                <a:hlinkClick r:id="rId6"/>
+              </a:rPr>
+              <a:t>http://dashpg.com</a:t>
+            </a:r>
+            <a:r>
+              <a:rPr lang="en-US" dirty="0" smtClean="0">
+                <a:hlinkClick r:id="rId6"/>
+              </a:rPr>
+              <a:t>/</a:t>
+            </a:r>
+            <a:endParaRPr lang="en-US" dirty="0"/>
+          </a:p>
+        </p:txBody>
+      </p:sp>
     </p:spTree>
     <p:extLst>
       <p:ext uri="{BB962C8B-B14F-4D97-AF65-F5344CB8AC3E}">
         <p14:creationId xmlns:p14="http://schemas.microsoft.com/office/powerpoint/2010/main" val="840763685"/>
+      </p:ext>
+    </p:extLst>
+  </p:cSld>
+  <p:clrMapOvr>
+    <a:masterClrMapping/>
+  </p:clrMapOvr>
+  <mc:AlternateContent xmlns:mc="http://schemas.openxmlformats.org/markup-compatibility/2006">
+    <mc:Choice xmlns:p14="http://schemas.microsoft.com/office/powerpoint/2010/main" Requires="p14">
+      <p:transition p14:dur="10"/>
+    </mc:Choice>
+    <mc:Fallback>
+      <p:transition/>
+    </mc:Fallback>
+  </mc:AlternateContent>
+  <p:timing>
+    <p:tnLst>
+      <p:par>
+        <p:cTn id="1" dur="indefinite" restart="never" nodeType="tmRoot"/>
+      </p:par>
+    </p:tnLst>
+  </p:timing>
+</p:sld>
+</file>
+
+<file path=ppt/slides/slide19.xml><?xml version="1.0" encoding="utf-8"?>
+<p:sld xmlns:a="http://schemas.openxmlformats.org/drawingml/2006/main" xmlns:r="http://schemas.openxmlformats.org/officeDocument/2006/relationships" xmlns:p="http://schemas.openxmlformats.org/presentationml/2006/main">
+  <p:cSld>
+    <p:spTree>
+      <p:nvGrpSpPr>
+        <p:cNvPr id="1" name=""/>
+        <p:cNvGrpSpPr/>
+        <p:nvPr/>
+      </p:nvGrpSpPr>
+      <p:grpSpPr>
+        <a:xfrm>
+          <a:off x="0" y="0"/>
+          <a:ext cx="0" cy="0"/>
+          <a:chOff x="0" y="0"/>
+          <a:chExt cx="0" cy="0"/>
+        </a:xfrm>
+      </p:grpSpPr>
+      <p:sp>
+        <p:nvSpPr>
+          <p:cNvPr id="2" name="Title 1"/>
+          <p:cNvSpPr>
+            <a:spLocks noGrp="1"/>
+          </p:cNvSpPr>
+          <p:nvPr>
+            <p:ph type="title"/>
+          </p:nvPr>
+        </p:nvSpPr>
+        <p:spPr/>
+        <p:txBody>
+          <a:bodyPr>
+            <a:normAutofit/>
+          </a:bodyPr>
+          <a:lstStyle/>
+          <a:p>
+            <a:r>
+              <a:rPr lang="es-AR" dirty="0" smtClean="0"/>
+              <a:t>¿Qué clientes soportan MPEG</a:t>
+            </a:r>
+            <a:r>
+              <a:rPr lang="en-US" dirty="0" smtClean="0"/>
+              <a:t>-DASH?</a:t>
+            </a:r>
+            <a:endParaRPr lang="es-AR" dirty="0"/>
+          </a:p>
+        </p:txBody>
+      </p:sp>
+      <p:pic>
+        <p:nvPicPr>
+          <p:cNvPr id="8" name="Picture 7"/>
+          <p:cNvPicPr>
+            <a:picLocks noChangeAspect="1"/>
+          </p:cNvPicPr>
+          <p:nvPr/>
+        </p:nvPicPr>
+        <p:blipFill rotWithShape="1">
+          <a:blip r:embed="rId2">
+            <a:extLst>
+              <a:ext uri="{28A0092B-C50C-407E-A947-70E740481C1C}">
+                <a14:useLocalDpi xmlns:a14="http://schemas.microsoft.com/office/drawing/2010/main" val="0"/>
+              </a:ext>
+            </a:extLst>
+          </a:blip>
+          <a:srcRect l="19308" t="11499" r="22695" b="19511"/>
+          <a:stretch/>
+        </p:blipFill>
+        <p:spPr>
+          <a:xfrm>
+            <a:off x="606424" y="1916832"/>
+            <a:ext cx="1656184" cy="1296144"/>
+          </a:xfrm>
+          <a:prstGeom prst="rect">
+            <a:avLst/>
+          </a:prstGeom>
+        </p:spPr>
+      </p:pic>
+      <p:sp>
+        <p:nvSpPr>
+          <p:cNvPr id="9" name="Rounded Rectangle 8"/>
+          <p:cNvSpPr/>
+          <p:nvPr/>
+        </p:nvSpPr>
+        <p:spPr>
+          <a:xfrm>
+            <a:off x="2215158" y="2132856"/>
+            <a:ext cx="1454474" cy="792088"/>
+          </a:xfrm>
+          <a:prstGeom prst="roundRect">
+            <a:avLst/>
+          </a:prstGeom>
+        </p:spPr>
+        <p:style>
+          <a:lnRef idx="2">
+            <a:schemeClr val="accent1"/>
+          </a:lnRef>
+          <a:fillRef idx="1">
+            <a:schemeClr val="lt1"/>
+          </a:fillRef>
+          <a:effectRef idx="0">
+            <a:schemeClr val="accent1"/>
+          </a:effectRef>
+          <a:fontRef idx="minor">
+            <a:schemeClr val="dk1"/>
+          </a:fontRef>
+        </p:style>
+        <p:txBody>
+          <a:bodyPr rtlCol="0" anchor="ctr"/>
+          <a:lstStyle/>
+          <a:p>
+            <a:pPr algn="ctr"/>
+            <a:r>
+              <a:rPr lang="en-US" sz="2400" dirty="0" smtClean="0">
+                <a:solidFill>
+                  <a:schemeClr val="accent1">
+                    <a:lumMod val="75000"/>
+                  </a:schemeClr>
+                </a:solidFill>
+              </a:rPr>
+              <a:t>&lt;video&gt;</a:t>
+            </a:r>
+            <a:endParaRPr lang="en-US" sz="2400" dirty="0">
+              <a:solidFill>
+                <a:schemeClr val="accent1">
+                  <a:lumMod val="75000"/>
+                </a:schemeClr>
+              </a:solidFill>
+            </a:endParaRPr>
+          </a:p>
+        </p:txBody>
+      </p:sp>
+      <p:cxnSp>
+        <p:nvCxnSpPr>
+          <p:cNvPr id="11" name="Straight Arrow Connector 10"/>
+          <p:cNvCxnSpPr/>
+          <p:nvPr/>
+        </p:nvCxnSpPr>
+        <p:spPr>
+          <a:xfrm>
+            <a:off x="3804270" y="2336354"/>
+            <a:ext cx="1296144" cy="0"/>
+          </a:xfrm>
+          <a:prstGeom prst="straightConnector1">
+            <a:avLst/>
+          </a:prstGeom>
+          <a:ln w="19050">
+            <a:solidFill>
+              <a:srgbClr val="00B0F0"/>
+            </a:solidFill>
+            <a:headEnd type="oval" w="lg" len="lg"/>
+            <a:tailEnd type="triangle" w="lg" len="lg"/>
+          </a:ln>
+        </p:spPr>
+        <p:style>
+          <a:lnRef idx="1">
+            <a:schemeClr val="accent1"/>
+          </a:lnRef>
+          <a:fillRef idx="0">
+            <a:schemeClr val="accent1"/>
+          </a:fillRef>
+          <a:effectRef idx="0">
+            <a:schemeClr val="accent1"/>
+          </a:effectRef>
+          <a:fontRef idx="minor">
+            <a:schemeClr val="tx1"/>
+          </a:fontRef>
+        </p:style>
+      </p:cxnSp>
+      <p:cxnSp>
+        <p:nvCxnSpPr>
+          <p:cNvPr id="18" name="Straight Arrow Connector 17"/>
+          <p:cNvCxnSpPr/>
+          <p:nvPr/>
+        </p:nvCxnSpPr>
+        <p:spPr>
+          <a:xfrm>
+            <a:off x="3804270" y="2768402"/>
+            <a:ext cx="1296144" cy="0"/>
+          </a:xfrm>
+          <a:prstGeom prst="straightConnector1">
+            <a:avLst/>
+          </a:prstGeom>
+          <a:ln w="19050">
+            <a:solidFill>
+              <a:srgbClr val="00B0F0"/>
+            </a:solidFill>
+            <a:headEnd type="oval" w="lg" len="lg"/>
+            <a:tailEnd type="triangle" w="lg" len="lg"/>
+          </a:ln>
+        </p:spPr>
+        <p:style>
+          <a:lnRef idx="1">
+            <a:schemeClr val="accent1"/>
+          </a:lnRef>
+          <a:fillRef idx="0">
+            <a:schemeClr val="accent1"/>
+          </a:fillRef>
+          <a:effectRef idx="0">
+            <a:schemeClr val="accent1"/>
+          </a:effectRef>
+          <a:fontRef idx="minor">
+            <a:schemeClr val="tx1"/>
+          </a:fontRef>
+        </p:style>
+      </p:cxnSp>
+      <p:sp>
+        <p:nvSpPr>
+          <p:cNvPr id="19" name="Rectangle 18"/>
+          <p:cNvSpPr/>
+          <p:nvPr/>
+        </p:nvSpPr>
+        <p:spPr>
+          <a:xfrm>
+            <a:off x="5058328" y="2124378"/>
+            <a:ext cx="7206140" cy="369332"/>
+          </a:xfrm>
+          <a:prstGeom prst="rect">
+            <a:avLst/>
+          </a:prstGeom>
+        </p:spPr>
+        <p:txBody>
+          <a:bodyPr wrap="none">
+            <a:spAutoFit/>
+          </a:bodyPr>
+          <a:lstStyle/>
+          <a:p>
+            <a:r>
+              <a:rPr lang="es-AR" dirty="0" smtClean="0">
+                <a:solidFill>
+                  <a:srgbClr val="00B0F0"/>
+                </a:solidFill>
+              </a:rPr>
+              <a:t>Media Source Extension (MSE) API</a:t>
+            </a:r>
+            <a:r>
+              <a:rPr lang="es-AR" dirty="0" smtClean="0"/>
+              <a:t>: Permite DASH adaptive streaming</a:t>
+            </a:r>
+          </a:p>
+        </p:txBody>
+      </p:sp>
+      <p:sp>
+        <p:nvSpPr>
+          <p:cNvPr id="25" name="Rectangle 24"/>
+          <p:cNvSpPr/>
+          <p:nvPr/>
+        </p:nvSpPr>
+        <p:spPr>
+          <a:xfrm>
+            <a:off x="5058328" y="2583735"/>
+            <a:ext cx="6985438" cy="369332"/>
+          </a:xfrm>
+          <a:prstGeom prst="rect">
+            <a:avLst/>
+          </a:prstGeom>
+        </p:spPr>
+        <p:txBody>
+          <a:bodyPr wrap="none">
+            <a:spAutoFit/>
+          </a:bodyPr>
+          <a:lstStyle/>
+          <a:p>
+            <a:r>
+              <a:rPr lang="es-AR" dirty="0" smtClean="0">
+                <a:solidFill>
+                  <a:srgbClr val="00B0F0"/>
+                </a:solidFill>
+              </a:rPr>
+              <a:t>Encrypted Media Extension (EME) API</a:t>
+            </a:r>
+            <a:r>
+              <a:rPr lang="es-AR" dirty="0" smtClean="0"/>
+              <a:t>: Adquisición de licencia DRM</a:t>
+            </a:r>
+          </a:p>
+        </p:txBody>
+      </p:sp>
+      <p:sp>
+        <p:nvSpPr>
+          <p:cNvPr id="12" name="Rectangle 11"/>
+          <p:cNvSpPr/>
+          <p:nvPr/>
+        </p:nvSpPr>
+        <p:spPr>
+          <a:xfrm>
+            <a:off x="606424" y="1461613"/>
+            <a:ext cx="3484031" cy="563231"/>
+          </a:xfrm>
+          <a:prstGeom prst="rect">
+            <a:avLst/>
+          </a:prstGeom>
+        </p:spPr>
+        <p:txBody>
+          <a:bodyPr wrap="none">
+            <a:spAutoFit/>
+          </a:bodyPr>
+          <a:lstStyle/>
+          <a:p>
+            <a:pPr marL="0" lvl="1" indent="0">
+              <a:lnSpc>
+                <a:spcPct val="85000"/>
+              </a:lnSpc>
+              <a:spcBef>
+                <a:spcPts val="900"/>
+              </a:spcBef>
+              <a:buNone/>
+            </a:pPr>
+            <a:r>
+              <a:rPr lang="es-AR" sz="3600" dirty="0" smtClean="0">
+                <a:solidFill>
+                  <a:schemeClr val="accent6"/>
+                </a:solidFill>
+                <a:latin typeface="Segoe UI Light" pitchFamily="34" charset="0"/>
+              </a:rPr>
+              <a:t>Browser (HTML5)</a:t>
+            </a:r>
+            <a:endParaRPr lang="es-AR" sz="3600" dirty="0"/>
+          </a:p>
+        </p:txBody>
+      </p:sp>
+      <p:sp>
+        <p:nvSpPr>
+          <p:cNvPr id="26" name="Rectangle 25"/>
+          <p:cNvSpPr/>
+          <p:nvPr/>
+        </p:nvSpPr>
+        <p:spPr>
+          <a:xfrm>
+            <a:off x="660406" y="3445101"/>
+            <a:ext cx="7583871" cy="369332"/>
+          </a:xfrm>
+          <a:prstGeom prst="rect">
+            <a:avLst/>
+          </a:prstGeom>
+        </p:spPr>
+        <p:txBody>
+          <a:bodyPr wrap="none">
+            <a:spAutoFit/>
+          </a:bodyPr>
+          <a:lstStyle/>
+          <a:p>
+            <a:r>
+              <a:rPr lang="es-AR" dirty="0" smtClean="0">
+                <a:hlinkClick r:id="rId3"/>
+              </a:rPr>
+              <a:t>DASH.JS</a:t>
+            </a:r>
+            <a:r>
+              <a:rPr lang="es-AR" dirty="0" smtClean="0"/>
+              <a:t>: Una librería JavaScript que permite reproducir DASH vía HTML5</a:t>
+            </a:r>
+          </a:p>
+        </p:txBody>
+      </p:sp>
+      <p:sp>
+        <p:nvSpPr>
+          <p:cNvPr id="27" name="Rectangle 26"/>
+          <p:cNvSpPr/>
+          <p:nvPr/>
+        </p:nvSpPr>
+        <p:spPr>
+          <a:xfrm>
+            <a:off x="669054" y="4005064"/>
+            <a:ext cx="3908634" cy="563231"/>
+          </a:xfrm>
+          <a:prstGeom prst="rect">
+            <a:avLst/>
+          </a:prstGeom>
+        </p:spPr>
+        <p:txBody>
+          <a:bodyPr wrap="none">
+            <a:spAutoFit/>
+          </a:bodyPr>
+          <a:lstStyle/>
+          <a:p>
+            <a:pPr marL="0" lvl="1" indent="0">
+              <a:lnSpc>
+                <a:spcPct val="85000"/>
+              </a:lnSpc>
+              <a:spcBef>
+                <a:spcPts val="900"/>
+              </a:spcBef>
+              <a:buNone/>
+            </a:pPr>
+            <a:r>
+              <a:rPr lang="es-AR" sz="3600" dirty="0" smtClean="0">
+                <a:solidFill>
+                  <a:schemeClr val="accent6"/>
+                </a:solidFill>
+                <a:latin typeface="Segoe UI Light" pitchFamily="34" charset="0"/>
+              </a:rPr>
+              <a:t>Windows 8 y DASH</a:t>
+            </a:r>
+            <a:endParaRPr lang="es-AR" sz="3600" dirty="0"/>
+          </a:p>
+        </p:txBody>
+      </p:sp>
+      <p:sp>
+        <p:nvSpPr>
+          <p:cNvPr id="28" name="Rectangle 27"/>
+          <p:cNvSpPr/>
+          <p:nvPr/>
+        </p:nvSpPr>
+        <p:spPr>
+          <a:xfrm>
+            <a:off x="727030" y="5302247"/>
+            <a:ext cx="5368970" cy="563231"/>
+          </a:xfrm>
+          <a:prstGeom prst="rect">
+            <a:avLst/>
+          </a:prstGeom>
+        </p:spPr>
+        <p:txBody>
+          <a:bodyPr wrap="none">
+            <a:spAutoFit/>
+          </a:bodyPr>
+          <a:lstStyle/>
+          <a:p>
+            <a:pPr marL="0" lvl="1" indent="0">
+              <a:lnSpc>
+                <a:spcPct val="85000"/>
+              </a:lnSpc>
+              <a:spcBef>
+                <a:spcPts val="900"/>
+              </a:spcBef>
+              <a:buNone/>
+            </a:pPr>
+            <a:r>
+              <a:rPr lang="es-AR" sz="3600" dirty="0" smtClean="0">
+                <a:solidFill>
+                  <a:schemeClr val="accent6"/>
+                </a:solidFill>
+                <a:latin typeface="Segoe UI Light" pitchFamily="34" charset="0"/>
+              </a:rPr>
+              <a:t>Flash OSMF Plugin y DASH</a:t>
+            </a:r>
+            <a:endParaRPr lang="es-AR" sz="3600" dirty="0"/>
+          </a:p>
+        </p:txBody>
+      </p:sp>
+      <p:sp>
+        <p:nvSpPr>
+          <p:cNvPr id="29" name="Rectangle 28"/>
+          <p:cNvSpPr/>
+          <p:nvPr/>
+        </p:nvSpPr>
+        <p:spPr>
+          <a:xfrm>
+            <a:off x="760884" y="4576138"/>
+            <a:ext cx="6963894" cy="369332"/>
+          </a:xfrm>
+          <a:prstGeom prst="rect">
+            <a:avLst/>
+          </a:prstGeom>
+        </p:spPr>
+        <p:txBody>
+          <a:bodyPr wrap="none">
+            <a:spAutoFit/>
+          </a:bodyPr>
+          <a:lstStyle/>
+          <a:p>
+            <a:r>
+              <a:rPr lang="es-AR" dirty="0" smtClean="0"/>
+              <a:t>Microsoft Player Framework: </a:t>
+            </a:r>
+            <a:r>
+              <a:rPr lang="es-AR" dirty="0" smtClean="0">
+                <a:hlinkClick r:id="rId4"/>
+              </a:rPr>
+              <a:t>http://playerframework.codeplex.com</a:t>
+            </a:r>
+            <a:r>
+              <a:rPr lang="es-AR" dirty="0" smtClean="0"/>
+              <a:t> </a:t>
+            </a:r>
+          </a:p>
+        </p:txBody>
+      </p:sp>
+      <p:sp>
+        <p:nvSpPr>
+          <p:cNvPr id="30" name="Rectangle 29"/>
+          <p:cNvSpPr/>
+          <p:nvPr/>
+        </p:nvSpPr>
+        <p:spPr>
+          <a:xfrm>
+            <a:off x="767408" y="5861549"/>
+            <a:ext cx="1712713" cy="369332"/>
+          </a:xfrm>
+          <a:prstGeom prst="rect">
+            <a:avLst/>
+          </a:prstGeom>
+        </p:spPr>
+        <p:txBody>
+          <a:bodyPr wrap="none">
+            <a:spAutoFit/>
+          </a:bodyPr>
+          <a:lstStyle/>
+          <a:p>
+            <a:r>
+              <a:rPr lang="es-AR" dirty="0" err="1" smtClean="0"/>
+              <a:t>Proximamente</a:t>
+            </a:r>
+            <a:r>
+              <a:rPr lang="es-AR" dirty="0" smtClean="0"/>
+              <a:t>!</a:t>
+            </a:r>
+          </a:p>
+        </p:txBody>
+      </p:sp>
+    </p:spTree>
+    <p:extLst>
+      <p:ext uri="{BB962C8B-B14F-4D97-AF65-F5344CB8AC3E}">
+        <p14:creationId xmlns:p14="http://schemas.microsoft.com/office/powerpoint/2010/main" val="2342960708"/>
+      </p:ext>
+    </p:extLst>
+  </p:cSld>
+  <p:clrMapOvr>
+    <a:masterClrMapping/>
+  </p:clrMapOvr>
+  <mc:AlternateContent xmlns:mc="http://schemas.openxmlformats.org/markup-compatibility/2006">
+    <mc:Choice xmlns:p14="http://schemas.microsoft.com/office/powerpoint/2010/main" Requires="p14">
+      <p:transition p14:dur="10"/>
+    </mc:Choice>
+    <mc:Fallback>
+      <p:transition/>
+    </mc:Fallback>
+  </mc:AlternateContent>
+  <p:timing>
+    <p:tnLst>
+      <p:par>
+        <p:cTn id="1" dur="indefinite" restart="never" nodeType="tmRoot"/>
+      </p:par>
+    </p:tnLst>
+  </p:timing>
+</p:sld>
+</file>
+
+<file path=ppt/slides/slide2.xml><?xml version="1.0" encoding="utf-8"?>
+<p:sld xmlns:a="http://schemas.openxmlformats.org/drawingml/2006/main" xmlns:r="http://schemas.openxmlformats.org/officeDocument/2006/relationships" xmlns:p="http://schemas.openxmlformats.org/presentationml/2006/main">
+  <p:cSld>
+    <p:spTree>
+      <p:nvGrpSpPr>
+        <p:cNvPr id="1" name=""/>
+        <p:cNvGrpSpPr/>
+        <p:nvPr/>
+      </p:nvGrpSpPr>
+      <p:grpSpPr>
+        <a:xfrm>
+          <a:off x="0" y="0"/>
+          <a:ext cx="0" cy="0"/>
+          <a:chOff x="0" y="0"/>
+          <a:chExt cx="0" cy="0"/>
+        </a:xfrm>
+      </p:grpSpPr>
+      <p:sp>
+        <p:nvSpPr>
+          <p:cNvPr id="2" name="Title 1"/>
+          <p:cNvSpPr>
+            <a:spLocks noGrp="1"/>
+          </p:cNvSpPr>
+          <p:nvPr>
+            <p:ph type="title"/>
+          </p:nvPr>
+        </p:nvSpPr>
+        <p:spPr>
+          <a:xfrm>
+            <a:off x="839416" y="2857500"/>
+            <a:ext cx="10513168" cy="1143000"/>
+          </a:xfrm>
+        </p:spPr>
+        <p:txBody>
+          <a:bodyPr>
+            <a:noAutofit/>
+          </a:bodyPr>
+          <a:lstStyle/>
+          <a:p>
+            <a:r>
+              <a:rPr lang="en-US" dirty="0" smtClean="0"/>
+              <a:t>http://</a:t>
+            </a:r>
+            <a:r>
+              <a:rPr lang="en-US" sz="5400" dirty="0" smtClean="0"/>
+              <a:t>blogs.southworks.net/about-us</a:t>
+            </a:r>
+            <a:endParaRPr lang="es-AR" dirty="0"/>
+          </a:p>
+        </p:txBody>
+      </p:sp>
+    </p:spTree>
+    <p:extLst>
+      <p:ext uri="{BB962C8B-B14F-4D97-AF65-F5344CB8AC3E}">
+        <p14:creationId xmlns:p14="http://schemas.microsoft.com/office/powerpoint/2010/main" val="2565305341"/>
       </p:ext>
     </p:extLst>
   </p:cSld>
@@ -26028,7 +26892,7 @@
 </p:sld>
 </file>
 
-<file path=ppt/slides/slide19.xml><?xml version="1.0" encoding="utf-8"?>
+<file path=ppt/slides/slide20.xml><?xml version="1.0" encoding="utf-8"?>
 <p:sld xmlns:a="http://schemas.openxmlformats.org/drawingml/2006/main" xmlns:r="http://schemas.openxmlformats.org/officeDocument/2006/relationships" xmlns:p="http://schemas.openxmlformats.org/presentationml/2006/main">
   <p:cSld>
     <p:spTree>
@@ -27232,21 +28096,7 @@
                   <a:latin typeface="Segoe UI" pitchFamily="34" charset="0"/>
                   <a:cs typeface="Segoe UI" pitchFamily="34" charset="0"/>
                 </a:rPr>
-                <a:t>Construido en base a las capacidades del </a:t>
-              </a:r>
-              <a:r>
-                <a:rPr lang="es-AR" sz="2400" dirty="0" err="1" smtClean="0">
-                  <a:latin typeface="Segoe UI" pitchFamily="34" charset="0"/>
-                  <a:cs typeface="Segoe UI" pitchFamily="34" charset="0"/>
-                </a:rPr>
-                <a:t>Smooth</a:t>
-              </a:r>
-              <a:r>
-                <a:rPr lang="es-AR" sz="2400" dirty="0" smtClean="0">
-                  <a:latin typeface="Segoe UI" pitchFamily="34" charset="0"/>
-                  <a:cs typeface="Segoe UI" pitchFamily="34" charset="0"/>
-                </a:rPr>
-                <a:t> Streaming </a:t>
+                <a:t>Construido en base a las capacidades del Smooth Streaming </a:t>
               </a:r>
               <a:r>
                 <a:rPr lang="es-AR" sz="2400" dirty="0" err="1" smtClean="0">
@@ -27572,21 +28422,7 @@
                   <a:latin typeface="Segoe UI" pitchFamily="34" charset="0"/>
                   <a:cs typeface="Segoe UI" pitchFamily="34" charset="0"/>
                 </a:rPr>
-                <a:t>Arquitectura a base de </a:t>
-              </a:r>
-              <a:r>
-                <a:rPr lang="es-AR" sz="2400" dirty="0" err="1" smtClean="0">
-                  <a:latin typeface="Segoe UI" pitchFamily="34" charset="0"/>
-                  <a:cs typeface="Segoe UI" pitchFamily="34" charset="0"/>
-                </a:rPr>
-                <a:t>plugins</a:t>
-              </a:r>
-              <a:r>
-                <a:rPr lang="es-AR" sz="2400" dirty="0" smtClean="0">
-                  <a:latin typeface="Segoe UI" pitchFamily="34" charset="0"/>
-                  <a:cs typeface="Segoe UI" pitchFamily="34" charset="0"/>
-                </a:rPr>
-                <a:t> – Importas solo lo que necesitas usar </a:t>
+                <a:t>Arquitectura a base de plugins – Importas solo lo que necesitas usar </a:t>
               </a:r>
             </a:p>
           </p:txBody>
@@ -27699,86 +28535,7 @@
 </p:sld>
 </file>
 
-<file path=ppt/slides/slide2.xml><?xml version="1.0" encoding="utf-8"?>
-<p:sld xmlns:a="http://schemas.openxmlformats.org/drawingml/2006/main" xmlns:r="http://schemas.openxmlformats.org/officeDocument/2006/relationships" xmlns:p="http://schemas.openxmlformats.org/presentationml/2006/main">
-  <p:cSld>
-    <p:spTree>
-      <p:nvGrpSpPr>
-        <p:cNvPr id="1" name=""/>
-        <p:cNvGrpSpPr/>
-        <p:nvPr/>
-      </p:nvGrpSpPr>
-      <p:grpSpPr>
-        <a:xfrm>
-          <a:off x="0" y="0"/>
-          <a:ext cx="0" cy="0"/>
-          <a:chOff x="0" y="0"/>
-          <a:chExt cx="0" cy="0"/>
-        </a:xfrm>
-      </p:grpSpPr>
-      <p:sp>
-        <p:nvSpPr>
-          <p:cNvPr id="2" name="Title 1"/>
-          <p:cNvSpPr>
-            <a:spLocks noGrp="1"/>
-          </p:cNvSpPr>
-          <p:nvPr>
-            <p:ph type="title"/>
-          </p:nvPr>
-        </p:nvSpPr>
-        <p:spPr>
-          <a:xfrm>
-            <a:off x="839416" y="2857500"/>
-            <a:ext cx="10513168" cy="1143000"/>
-          </a:xfrm>
-        </p:spPr>
-        <p:txBody>
-          <a:bodyPr>
-            <a:noAutofit/>
-          </a:bodyPr>
-          <a:lstStyle/>
-          <a:p>
-            <a:r>
-              <a:rPr lang="en-US" dirty="0" smtClean="0"/>
-              <a:t>http://</a:t>
-            </a:r>
-            <a:r>
-              <a:rPr lang="en-US" sz="5400" dirty="0" smtClean="0"/>
-              <a:t>blogs.southworks.net/about-us</a:t>
-            </a:r>
-            <a:endParaRPr lang="es-AR" dirty="0"/>
-          </a:p>
-        </p:txBody>
-      </p:sp>
-    </p:spTree>
-    <p:extLst>
-      <p:ext uri="{BB962C8B-B14F-4D97-AF65-F5344CB8AC3E}">
-        <p14:creationId xmlns:p14="http://schemas.microsoft.com/office/powerpoint/2010/main" val="2565305341"/>
-      </p:ext>
-    </p:extLst>
-  </p:cSld>
-  <p:clrMapOvr>
-    <a:masterClrMapping/>
-  </p:clrMapOvr>
-  <mc:AlternateContent xmlns:mc="http://schemas.openxmlformats.org/markup-compatibility/2006">
-    <mc:Choice xmlns:p14="http://schemas.microsoft.com/office/powerpoint/2010/main" Requires="p14">
-      <p:transition p14:dur="0"/>
-    </mc:Choice>
-    <mc:Fallback>
-      <p:transition/>
-    </mc:Fallback>
-  </mc:AlternateContent>
-  <p:timing>
-    <p:tnLst>
-      <p:par>
-        <p:cTn id="1" dur="indefinite" restart="never" nodeType="tmRoot"/>
-      </p:par>
-    </p:tnLst>
-  </p:timing>
-</p:sld>
-</file>
-
-<file path=ppt/slides/slide20.xml><?xml version="1.0" encoding="utf-8"?>
+<file path=ppt/slides/slide21.xml><?xml version="1.0" encoding="utf-8"?>
 <p:sld xmlns:a="http://schemas.openxmlformats.org/drawingml/2006/main" xmlns:r="http://schemas.openxmlformats.org/officeDocument/2006/relationships" xmlns:p="http://schemas.openxmlformats.org/presentationml/2006/main">
   <p:cSld>
     <p:spTree>
@@ -29694,7 +30451,7 @@
 </p:sld>
 </file>
 
-<file path=ppt/slides/slide21.xml><?xml version="1.0" encoding="utf-8"?>
+<file path=ppt/slides/slide22.xml><?xml version="1.0" encoding="utf-8"?>
 <p:sld xmlns:a="http://schemas.openxmlformats.org/drawingml/2006/main" xmlns:r="http://schemas.openxmlformats.org/officeDocument/2006/relationships" xmlns:p="http://schemas.openxmlformats.org/presentationml/2006/main">
   <p:cSld>
     <p:spTree>
@@ -30013,15 +30770,7 @@
             </a:pPr>
             <a:r>
               <a:rPr lang="es-AR" sz="2000" dirty="0"/>
-              <a:t>Players existentes pueden ser migrados y de esa manera utilizar el plugin de </a:t>
-            </a:r>
-            <a:r>
-              <a:rPr lang="es-AR" sz="2000" dirty="0" err="1"/>
-              <a:t>Smooth</a:t>
-            </a:r>
-            <a:r>
-              <a:rPr lang="es-AR" sz="2000" dirty="0"/>
-              <a:t> Streaming (pueden </a:t>
+              <a:t>Players existentes pueden ser migrados y de esa manera utilizar el plugin de Smooth Streaming (pueden </a:t>
             </a:r>
             <a:r>
               <a:rPr lang="es-AR" sz="2000" dirty="0" smtClean="0"/>
@@ -30148,23 +30897,7 @@
                   <a:schemeClr val="tx1"/>
                 </a:solidFill>
               </a:rPr>
-              <a:t> </a:t>
-            </a:r>
-            <a:r>
-              <a:rPr lang="es-AR" sz="2000" dirty="0" err="1" smtClean="0">
-                <a:solidFill>
-                  <a:schemeClr val="tx1"/>
-                </a:solidFill>
-              </a:rPr>
-              <a:t>Plugins</a:t>
-            </a:r>
-            <a:r>
-              <a:rPr lang="es-AR" sz="2000" dirty="0" smtClean="0">
-                <a:solidFill>
-                  <a:schemeClr val="tx1"/>
-                </a:solidFill>
-              </a:rPr>
-              <a:t> </a:t>
+              <a:t> Plugins </a:t>
             </a:r>
           </a:p>
           <a:p>
@@ -30480,15 +31213,7 @@
             </a:pPr>
             <a:r>
               <a:rPr lang="es-AR" sz="2000" dirty="0" smtClean="0"/>
-              <a:t>Ejemplo: Flash player para </a:t>
-            </a:r>
-            <a:r>
-              <a:rPr lang="es-AR" sz="2000" dirty="0" err="1" smtClean="0"/>
-              <a:t>Smooth</a:t>
-            </a:r>
-            <a:r>
-              <a:rPr lang="es-AR" sz="2000" dirty="0" smtClean="0"/>
-              <a:t> Streaming</a:t>
+              <a:t>Ejemplo: Flash player para Smooth Streaming</a:t>
             </a:r>
           </a:p>
           <a:p>
@@ -30533,7 +31258,7 @@
 </p:sld>
 </file>
 
-<file path=ppt/slides/slide22.xml><?xml version="1.0" encoding="utf-8"?>
+<file path=ppt/slides/slide23.xml><?xml version="1.0" encoding="utf-8"?>
 <p:sld xmlns:a="http://schemas.openxmlformats.org/drawingml/2006/main" xmlns:r="http://schemas.openxmlformats.org/officeDocument/2006/relationships" xmlns:p="http://schemas.openxmlformats.org/presentationml/2006/main">
   <p:cSld>
     <p:spTree>
@@ -31590,7 +32315,7 @@
 </p:sld>
 </file>
 
-<file path=ppt/slides/slide23.xml><?xml version="1.0" encoding="utf-8"?>
+<file path=ppt/slides/slide24.xml><?xml version="1.0" encoding="utf-8"?>
 <p:sld xmlns:a="http://schemas.openxmlformats.org/drawingml/2006/main" xmlns:r="http://schemas.openxmlformats.org/officeDocument/2006/relationships" xmlns:p="http://schemas.openxmlformats.org/presentationml/2006/main">
   <p:cSld>
     <p:bg>
@@ -31777,7 +32502,7 @@
 </p:sld>
 </file>
 
-<file path=ppt/slides/slide24.xml><?xml version="1.0" encoding="utf-8"?>
+<file path=ppt/slides/slide25.xml><?xml version="1.0" encoding="utf-8"?>
 <p:sld xmlns:a="http://schemas.openxmlformats.org/drawingml/2006/main" xmlns:r="http://schemas.openxmlformats.org/officeDocument/2006/relationships" xmlns:p="http://schemas.openxmlformats.org/presentationml/2006/main">
   <p:cSld>
     <p:bg>
@@ -34587,23 +35312,7 @@
                   <a:srgbClr val="00B0F0"/>
                 </a:solidFill>
               </a:rPr>
-              <a:t>*</a:t>
-            </a:r>
-            <a:r>
-              <a:rPr lang="es-AR" sz="1051" dirty="0" err="1">
-                <a:solidFill>
-                  <a:srgbClr val="00B0F0"/>
-                </a:solidFill>
-              </a:rPr>
-              <a:t>Source</a:t>
-            </a:r>
-            <a:r>
-              <a:rPr lang="es-AR" sz="1051" dirty="0">
-                <a:solidFill>
-                  <a:srgbClr val="00B0F0"/>
-                </a:solidFill>
-              </a:rPr>
-              <a:t>: Cisco, </a:t>
+              <a:t>*Source: Cisco, </a:t>
             </a:r>
             <a:r>
               <a:rPr lang="es-AR" sz="1051" dirty="0" err="1">
@@ -43435,11 +44144,7 @@
           <a:p>
             <a:r>
               <a:rPr lang="es-AR" dirty="0" smtClean="0"/>
-              <a:t>Soporte para MPEG-DASH esta en el road </a:t>
-            </a:r>
-            <a:r>
-              <a:rPr lang="es-AR" dirty="0" err="1" smtClean="0"/>
-              <a:t>map</a:t>
+              <a:t>Soporte para MPEG-DASH esta en el road map</a:t>
             </a:r>
             <a:endParaRPr lang="es-AR" dirty="0"/>
           </a:p>
@@ -48137,7 +48842,7 @@
           <a:graphicData uri="http://schemas.openxmlformats.org/presentationml/2006/ole">
             <mc:AlternateContent xmlns:mc="http://schemas.openxmlformats.org/markup-compatibility/2006">
               <mc:Choice xmlns:v="urn:schemas-microsoft-com:vml" Requires="v">
-                <p:oleObj spid="_x0000_s1152" name="think-cell Slide" r:id="rId7" imgW="360" imgH="360" progId="">
+                <p:oleObj spid="_x0000_s1163" name="think-cell Slide" r:id="rId7" imgW="360" imgH="360" progId="">
                   <p:embed/>
                 </p:oleObj>
               </mc:Choice>

</xml_diff>